<commit_message>
ajout partie benjamin pptx
</commit_message>
<xml_diff>
--- a/Livrable1/Livrable 1.pptx
+++ b/Livrable1/Livrable 1.pptx
@@ -7,6 +7,8 @@
   <p:sldIdLst>
     <p:sldId id="257" r:id="rId2"/>
     <p:sldId id="258" r:id="rId3"/>
+    <p:sldId id="259" r:id="rId4"/>
+    <p:sldId id="260" r:id="rId5"/>
   </p:sldIdLst>
   <p:sldSz cx="12192000" cy="6858000"/>
   <p:notesSz cx="6858000" cy="9144000"/>
@@ -252,7 +254,7 @@
           <a:p>
             <a:fld id="{638941B0-F4D5-4460-BCAD-F7E2B41A8257}" type="datetimeFigureOut">
               <a:rPr lang="de-DE" smtClean="0"/>
-              <a:t>21.03.2019</a:t>
+              <a:t>24.03.2019</a:t>
             </a:fld>
             <a:endParaRPr lang="de-DE"/>
           </a:p>
@@ -422,7 +424,7 @@
           <a:p>
             <a:fld id="{638941B0-F4D5-4460-BCAD-F7E2B41A8257}" type="datetimeFigureOut">
               <a:rPr lang="de-DE" smtClean="0"/>
-              <a:t>21.03.2019</a:t>
+              <a:t>24.03.2019</a:t>
             </a:fld>
             <a:endParaRPr lang="de-DE"/>
           </a:p>
@@ -602,7 +604,7 @@
           <a:p>
             <a:fld id="{638941B0-F4D5-4460-BCAD-F7E2B41A8257}" type="datetimeFigureOut">
               <a:rPr lang="de-DE" smtClean="0"/>
-              <a:t>21.03.2019</a:t>
+              <a:t>24.03.2019</a:t>
             </a:fld>
             <a:endParaRPr lang="de-DE"/>
           </a:p>
@@ -772,7 +774,7 @@
           <a:p>
             <a:fld id="{638941B0-F4D5-4460-BCAD-F7E2B41A8257}" type="datetimeFigureOut">
               <a:rPr lang="de-DE" smtClean="0"/>
-              <a:t>21.03.2019</a:t>
+              <a:t>24.03.2019</a:t>
             </a:fld>
             <a:endParaRPr lang="de-DE"/>
           </a:p>
@@ -1018,7 +1020,7 @@
           <a:p>
             <a:fld id="{638941B0-F4D5-4460-BCAD-F7E2B41A8257}" type="datetimeFigureOut">
               <a:rPr lang="de-DE" smtClean="0"/>
-              <a:t>21.03.2019</a:t>
+              <a:t>24.03.2019</a:t>
             </a:fld>
             <a:endParaRPr lang="de-DE"/>
           </a:p>
@@ -1250,7 +1252,7 @@
           <a:p>
             <a:fld id="{638941B0-F4D5-4460-BCAD-F7E2B41A8257}" type="datetimeFigureOut">
               <a:rPr lang="de-DE" smtClean="0"/>
-              <a:t>21.03.2019</a:t>
+              <a:t>24.03.2019</a:t>
             </a:fld>
             <a:endParaRPr lang="de-DE"/>
           </a:p>
@@ -1617,7 +1619,7 @@
           <a:p>
             <a:fld id="{638941B0-F4D5-4460-BCAD-F7E2B41A8257}" type="datetimeFigureOut">
               <a:rPr lang="de-DE" smtClean="0"/>
-              <a:t>21.03.2019</a:t>
+              <a:t>24.03.2019</a:t>
             </a:fld>
             <a:endParaRPr lang="de-DE"/>
           </a:p>
@@ -1735,7 +1737,7 @@
           <a:p>
             <a:fld id="{638941B0-F4D5-4460-BCAD-F7E2B41A8257}" type="datetimeFigureOut">
               <a:rPr lang="de-DE" smtClean="0"/>
-              <a:t>21.03.2019</a:t>
+              <a:t>24.03.2019</a:t>
             </a:fld>
             <a:endParaRPr lang="de-DE"/>
           </a:p>
@@ -1830,7 +1832,7 @@
           <a:p>
             <a:fld id="{638941B0-F4D5-4460-BCAD-F7E2B41A8257}" type="datetimeFigureOut">
               <a:rPr lang="de-DE" smtClean="0"/>
-              <a:t>21.03.2019</a:t>
+              <a:t>24.03.2019</a:t>
             </a:fld>
             <a:endParaRPr lang="de-DE"/>
           </a:p>
@@ -2107,7 +2109,7 @@
           <a:p>
             <a:fld id="{638941B0-F4D5-4460-BCAD-F7E2B41A8257}" type="datetimeFigureOut">
               <a:rPr lang="de-DE" smtClean="0"/>
-              <a:t>21.03.2019</a:t>
+              <a:t>24.03.2019</a:t>
             </a:fld>
             <a:endParaRPr lang="de-DE"/>
           </a:p>
@@ -2360,7 +2362,7 @@
           <a:p>
             <a:fld id="{638941B0-F4D5-4460-BCAD-F7E2B41A8257}" type="datetimeFigureOut">
               <a:rPr lang="de-DE" smtClean="0"/>
-              <a:t>21.03.2019</a:t>
+              <a:t>24.03.2019</a:t>
             </a:fld>
             <a:endParaRPr lang="de-DE"/>
           </a:p>
@@ -2573,7 +2575,7 @@
           <a:p>
             <a:fld id="{638941B0-F4D5-4460-BCAD-F7E2B41A8257}" type="datetimeFigureOut">
               <a:rPr lang="de-DE" smtClean="0"/>
-              <a:t>21.03.2019</a:t>
+              <a:t>24.03.2019</a:t>
             </a:fld>
             <a:endParaRPr lang="de-DE"/>
           </a:p>
@@ -4185,6 +4187,480 @@
 </p:sld>
 </file>
 
+<file path=ppt/slides/slide3.xml><?xml version="1.0" encoding="utf-8"?>
+<p:sld xmlns:a="http://schemas.openxmlformats.org/drawingml/2006/main" xmlns:r="http://schemas.openxmlformats.org/officeDocument/2006/relationships" xmlns:p="http://schemas.openxmlformats.org/presentationml/2006/main">
+  <p:cSld>
+    <p:spTree>
+      <p:nvGrpSpPr>
+        <p:cNvPr id="1" name=""/>
+        <p:cNvGrpSpPr/>
+        <p:nvPr/>
+      </p:nvGrpSpPr>
+      <p:grpSpPr>
+        <a:xfrm>
+          <a:off x="0" y="0"/>
+          <a:ext cx="0" cy="0"/>
+          <a:chOff x="0" y="0"/>
+          <a:chExt cx="0" cy="0"/>
+        </a:xfrm>
+      </p:grpSpPr>
+      <p:sp>
+        <p:nvSpPr>
+          <p:cNvPr id="2" name="Titre 1">
+            <a:extLst>
+              <a:ext uri="{FF2B5EF4-FFF2-40B4-BE49-F238E27FC236}">
+                <a16:creationId xmlns:a16="http://schemas.microsoft.com/office/drawing/2014/main" id="{1D03CCCF-1C0B-442B-8B97-C81916E625A4}"/>
+              </a:ext>
+            </a:extLst>
+          </p:cNvPr>
+          <p:cNvSpPr>
+            <a:spLocks noGrp="1"/>
+          </p:cNvSpPr>
+          <p:nvPr>
+            <p:ph type="title"/>
+          </p:nvPr>
+        </p:nvSpPr>
+        <p:spPr>
+          <a:xfrm>
+            <a:off x="838200" y="0"/>
+            <a:ext cx="10515600" cy="876693"/>
+          </a:xfrm>
+        </p:spPr>
+        <p:txBody>
+          <a:bodyPr/>
+          <a:lstStyle/>
+          <a:p>
+            <a:pPr algn="ctr"/>
+            <a:r>
+              <a:rPr lang="fr-FR" dirty="0"/>
+              <a:t>WBS</a:t>
+            </a:r>
+          </a:p>
+        </p:txBody>
+      </p:sp>
+      <p:pic>
+        <p:nvPicPr>
+          <p:cNvPr id="5" name="Image 4">
+            <a:extLst>
+              <a:ext uri="{FF2B5EF4-FFF2-40B4-BE49-F238E27FC236}">
+                <a16:creationId xmlns:a16="http://schemas.microsoft.com/office/drawing/2014/main" id="{CEE30613-55DC-4662-A682-722AC633E271}"/>
+              </a:ext>
+            </a:extLst>
+          </p:cNvPr>
+          <p:cNvPicPr>
+            <a:picLocks noChangeAspect="1"/>
+          </p:cNvPicPr>
+          <p:nvPr/>
+        </p:nvPicPr>
+        <p:blipFill rotWithShape="1">
+          <a:blip r:embed="rId2">
+            <a:extLst>
+              <a:ext uri="{28A0092B-C50C-407E-A947-70E740481C1C}">
+                <a14:useLocalDpi xmlns:a14="http://schemas.microsoft.com/office/drawing/2010/main" val="0"/>
+              </a:ext>
+            </a:extLst>
+          </a:blip>
+          <a:srcRect r="11392"/>
+          <a:stretch/>
+        </p:blipFill>
+        <p:spPr>
+          <a:xfrm>
+            <a:off x="694441" y="827202"/>
+            <a:ext cx="10803118" cy="5718994"/>
+          </a:xfrm>
+          <a:prstGeom prst="rect">
+            <a:avLst/>
+          </a:prstGeom>
+        </p:spPr>
+      </p:pic>
+    </p:spTree>
+    <p:extLst>
+      <p:ext uri="{BB962C8B-B14F-4D97-AF65-F5344CB8AC3E}">
+        <p14:creationId xmlns:p14="http://schemas.microsoft.com/office/powerpoint/2010/main" val="90994138"/>
+      </p:ext>
+    </p:extLst>
+  </p:cSld>
+  <p:clrMapOvr>
+    <a:masterClrMapping/>
+  </p:clrMapOvr>
+</p:sld>
+</file>
+
+<file path=ppt/slides/slide4.xml><?xml version="1.0" encoding="utf-8"?>
+<p:sld xmlns:a="http://schemas.openxmlformats.org/drawingml/2006/main" xmlns:r="http://schemas.openxmlformats.org/officeDocument/2006/relationships" xmlns:p="http://schemas.openxmlformats.org/presentationml/2006/main">
+  <p:cSld>
+    <p:spTree>
+      <p:nvGrpSpPr>
+        <p:cNvPr id="1" name=""/>
+        <p:cNvGrpSpPr/>
+        <p:nvPr/>
+      </p:nvGrpSpPr>
+      <p:grpSpPr>
+        <a:xfrm>
+          <a:off x="0" y="0"/>
+          <a:ext cx="0" cy="0"/>
+          <a:chOff x="0" y="0"/>
+          <a:chExt cx="0" cy="0"/>
+        </a:xfrm>
+      </p:grpSpPr>
+      <p:sp>
+        <p:nvSpPr>
+          <p:cNvPr id="3" name="Espace réservé du contenu 2">
+            <a:extLst>
+              <a:ext uri="{FF2B5EF4-FFF2-40B4-BE49-F238E27FC236}">
+                <a16:creationId xmlns:a16="http://schemas.microsoft.com/office/drawing/2014/main" id="{E5D6CA7B-075F-4A01-8F4B-05011447F9E0}"/>
+              </a:ext>
+            </a:extLst>
+          </p:cNvPr>
+          <p:cNvSpPr>
+            <a:spLocks noGrp="1"/>
+          </p:cNvSpPr>
+          <p:nvPr>
+            <p:ph idx="1"/>
+          </p:nvPr>
+        </p:nvSpPr>
+        <p:spPr>
+          <a:xfrm>
+            <a:off x="0" y="0"/>
+            <a:ext cx="6096000" cy="6858000"/>
+          </a:xfrm>
+        </p:spPr>
+        <p:txBody>
+          <a:bodyPr/>
+          <a:lstStyle/>
+          <a:p>
+            <a:pPr marL="0" indent="0">
+              <a:buNone/>
+            </a:pPr>
+            <a:r>
+              <a:rPr lang="fr-FR" dirty="0"/>
+              <a:t>Les indicateurs de suivi du projet :</a:t>
+            </a:r>
+          </a:p>
+          <a:p>
+            <a:pPr marL="0" indent="0">
+              <a:buNone/>
+            </a:pPr>
+            <a:endParaRPr lang="fr-FR" dirty="0"/>
+          </a:p>
+          <a:p>
+            <a:r>
+              <a:rPr lang="fr-FR" dirty="0"/>
+              <a:t>L’écart de durée</a:t>
+            </a:r>
+          </a:p>
+          <a:p>
+            <a:endParaRPr lang="fr-FR" dirty="0"/>
+          </a:p>
+          <a:p>
+            <a:r>
+              <a:rPr lang="fr-FR" dirty="0"/>
+              <a:t>L’écart de délai</a:t>
+            </a:r>
+          </a:p>
+          <a:p>
+            <a:endParaRPr lang="fr-FR" dirty="0"/>
+          </a:p>
+          <a:p>
+            <a:r>
+              <a:rPr lang="fr-FR" dirty="0"/>
+              <a:t>Le Taux de dépassement</a:t>
+            </a:r>
+          </a:p>
+          <a:p>
+            <a:endParaRPr lang="fr-FR" dirty="0"/>
+          </a:p>
+          <a:p>
+            <a:r>
+              <a:rPr lang="fr-FR" dirty="0"/>
+              <a:t>Le coût actuel du projet</a:t>
+            </a:r>
+          </a:p>
+          <a:p>
+            <a:endParaRPr lang="fr-FR" dirty="0"/>
+          </a:p>
+          <a:p>
+            <a:r>
+              <a:rPr lang="fr-FR" dirty="0"/>
+              <a:t>Le pourcentage de réalisation du projet</a:t>
+            </a:r>
+          </a:p>
+          <a:p>
+            <a:endParaRPr lang="fr-FR" dirty="0"/>
+          </a:p>
+          <a:p>
+            <a:r>
+              <a:rPr lang="fr-FR" dirty="0"/>
+              <a:t>Planification vs situation actuelle</a:t>
+            </a:r>
+          </a:p>
+        </p:txBody>
+      </p:sp>
+      <p:sp>
+        <p:nvSpPr>
+          <p:cNvPr id="6" name="Espace réservé du contenu 2">
+            <a:extLst>
+              <a:ext uri="{FF2B5EF4-FFF2-40B4-BE49-F238E27FC236}">
+                <a16:creationId xmlns:a16="http://schemas.microsoft.com/office/drawing/2014/main" id="{9F1B0F87-676E-43B2-9396-ADBEBC7CDCE5}"/>
+              </a:ext>
+            </a:extLst>
+          </p:cNvPr>
+          <p:cNvSpPr txBox="1">
+            <a:spLocks/>
+          </p:cNvSpPr>
+          <p:nvPr/>
+        </p:nvSpPr>
+        <p:spPr>
+          <a:xfrm>
+            <a:off x="6096000" y="0"/>
+            <a:ext cx="6096000" cy="6858000"/>
+          </a:xfrm>
+          <a:prstGeom prst="rect">
+            <a:avLst/>
+          </a:prstGeom>
+        </p:spPr>
+        <p:txBody>
+          <a:bodyPr vert="horz" lIns="91440" tIns="45720" rIns="91440" bIns="45720" rtlCol="0">
+            <a:normAutofit/>
+          </a:bodyPr>
+          <a:lstStyle>
+            <a:lvl1pPr marL="228600" indent="-228600" algn="l" defTabSz="914400" rtl="0" eaLnBrk="1" latinLnBrk="0" hangingPunct="1">
+              <a:lnSpc>
+                <a:spcPct val="90000"/>
+              </a:lnSpc>
+              <a:spcBef>
+                <a:spcPts val="1000"/>
+              </a:spcBef>
+              <a:buFont typeface="Arial" panose="020B0604020202020204" pitchFamily="34" charset="0"/>
+              <a:buChar char="•"/>
+              <a:defRPr sz="2800" kern="1200">
+                <a:solidFill>
+                  <a:schemeClr val="tx1"/>
+                </a:solidFill>
+                <a:latin typeface="+mn-lt"/>
+                <a:ea typeface="+mn-ea"/>
+                <a:cs typeface="+mn-cs"/>
+              </a:defRPr>
+            </a:lvl1pPr>
+            <a:lvl2pPr marL="685800" indent="-228600" algn="l" defTabSz="914400" rtl="0" eaLnBrk="1" latinLnBrk="0" hangingPunct="1">
+              <a:lnSpc>
+                <a:spcPct val="90000"/>
+              </a:lnSpc>
+              <a:spcBef>
+                <a:spcPts val="500"/>
+              </a:spcBef>
+              <a:buFont typeface="Arial" panose="020B0604020202020204" pitchFamily="34" charset="0"/>
+              <a:buChar char="•"/>
+              <a:defRPr sz="2400" kern="1200">
+                <a:solidFill>
+                  <a:schemeClr val="tx1"/>
+                </a:solidFill>
+                <a:latin typeface="+mn-lt"/>
+                <a:ea typeface="+mn-ea"/>
+                <a:cs typeface="+mn-cs"/>
+              </a:defRPr>
+            </a:lvl2pPr>
+            <a:lvl3pPr marL="1143000" indent="-228600" algn="l" defTabSz="914400" rtl="0" eaLnBrk="1" latinLnBrk="0" hangingPunct="1">
+              <a:lnSpc>
+                <a:spcPct val="90000"/>
+              </a:lnSpc>
+              <a:spcBef>
+                <a:spcPts val="500"/>
+              </a:spcBef>
+              <a:buFont typeface="Arial" panose="020B0604020202020204" pitchFamily="34" charset="0"/>
+              <a:buChar char="•"/>
+              <a:defRPr sz="2000" kern="1200">
+                <a:solidFill>
+                  <a:schemeClr val="tx1"/>
+                </a:solidFill>
+                <a:latin typeface="+mn-lt"/>
+                <a:ea typeface="+mn-ea"/>
+                <a:cs typeface="+mn-cs"/>
+              </a:defRPr>
+            </a:lvl3pPr>
+            <a:lvl4pPr marL="1600200" indent="-228600" algn="l" defTabSz="914400" rtl="0" eaLnBrk="1" latinLnBrk="0" hangingPunct="1">
+              <a:lnSpc>
+                <a:spcPct val="90000"/>
+              </a:lnSpc>
+              <a:spcBef>
+                <a:spcPts val="500"/>
+              </a:spcBef>
+              <a:buFont typeface="Arial" panose="020B0604020202020204" pitchFamily="34" charset="0"/>
+              <a:buChar char="•"/>
+              <a:defRPr sz="1800" kern="1200">
+                <a:solidFill>
+                  <a:schemeClr val="tx1"/>
+                </a:solidFill>
+                <a:latin typeface="+mn-lt"/>
+                <a:ea typeface="+mn-ea"/>
+                <a:cs typeface="+mn-cs"/>
+              </a:defRPr>
+            </a:lvl4pPr>
+            <a:lvl5pPr marL="2057400" indent="-228600" algn="l" defTabSz="914400" rtl="0" eaLnBrk="1" latinLnBrk="0" hangingPunct="1">
+              <a:lnSpc>
+                <a:spcPct val="90000"/>
+              </a:lnSpc>
+              <a:spcBef>
+                <a:spcPts val="500"/>
+              </a:spcBef>
+              <a:buFont typeface="Arial" panose="020B0604020202020204" pitchFamily="34" charset="0"/>
+              <a:buChar char="•"/>
+              <a:defRPr sz="1800" kern="1200">
+                <a:solidFill>
+                  <a:schemeClr val="tx1"/>
+                </a:solidFill>
+                <a:latin typeface="+mn-lt"/>
+                <a:ea typeface="+mn-ea"/>
+                <a:cs typeface="+mn-cs"/>
+              </a:defRPr>
+            </a:lvl5pPr>
+            <a:lvl6pPr marL="2514600" indent="-228600" algn="l" defTabSz="914400" rtl="0" eaLnBrk="1" latinLnBrk="0" hangingPunct="1">
+              <a:lnSpc>
+                <a:spcPct val="90000"/>
+              </a:lnSpc>
+              <a:spcBef>
+                <a:spcPts val="500"/>
+              </a:spcBef>
+              <a:buFont typeface="Arial" panose="020B0604020202020204" pitchFamily="34" charset="0"/>
+              <a:buChar char="•"/>
+              <a:defRPr sz="1800" kern="1200">
+                <a:solidFill>
+                  <a:schemeClr val="tx1"/>
+                </a:solidFill>
+                <a:latin typeface="+mn-lt"/>
+                <a:ea typeface="+mn-ea"/>
+                <a:cs typeface="+mn-cs"/>
+              </a:defRPr>
+            </a:lvl6pPr>
+            <a:lvl7pPr marL="2971800" indent="-228600" algn="l" defTabSz="914400" rtl="0" eaLnBrk="1" latinLnBrk="0" hangingPunct="1">
+              <a:lnSpc>
+                <a:spcPct val="90000"/>
+              </a:lnSpc>
+              <a:spcBef>
+                <a:spcPts val="500"/>
+              </a:spcBef>
+              <a:buFont typeface="Arial" panose="020B0604020202020204" pitchFamily="34" charset="0"/>
+              <a:buChar char="•"/>
+              <a:defRPr sz="1800" kern="1200">
+                <a:solidFill>
+                  <a:schemeClr val="tx1"/>
+                </a:solidFill>
+                <a:latin typeface="+mn-lt"/>
+                <a:ea typeface="+mn-ea"/>
+                <a:cs typeface="+mn-cs"/>
+              </a:defRPr>
+            </a:lvl7pPr>
+            <a:lvl8pPr marL="3429000" indent="-228600" algn="l" defTabSz="914400" rtl="0" eaLnBrk="1" latinLnBrk="0" hangingPunct="1">
+              <a:lnSpc>
+                <a:spcPct val="90000"/>
+              </a:lnSpc>
+              <a:spcBef>
+                <a:spcPts val="500"/>
+              </a:spcBef>
+              <a:buFont typeface="Arial" panose="020B0604020202020204" pitchFamily="34" charset="0"/>
+              <a:buChar char="•"/>
+              <a:defRPr sz="1800" kern="1200">
+                <a:solidFill>
+                  <a:schemeClr val="tx1"/>
+                </a:solidFill>
+                <a:latin typeface="+mn-lt"/>
+                <a:ea typeface="+mn-ea"/>
+                <a:cs typeface="+mn-cs"/>
+              </a:defRPr>
+            </a:lvl8pPr>
+            <a:lvl9pPr marL="3886200" indent="-228600" algn="l" defTabSz="914400" rtl="0" eaLnBrk="1" latinLnBrk="0" hangingPunct="1">
+              <a:lnSpc>
+                <a:spcPct val="90000"/>
+              </a:lnSpc>
+              <a:spcBef>
+                <a:spcPts val="500"/>
+              </a:spcBef>
+              <a:buFont typeface="Arial" panose="020B0604020202020204" pitchFamily="34" charset="0"/>
+              <a:buChar char="•"/>
+              <a:defRPr sz="1800" kern="1200">
+                <a:solidFill>
+                  <a:schemeClr val="tx1"/>
+                </a:solidFill>
+                <a:latin typeface="+mn-lt"/>
+                <a:ea typeface="+mn-ea"/>
+                <a:cs typeface="+mn-cs"/>
+              </a:defRPr>
+            </a:lvl9pPr>
+          </a:lstStyle>
+          <a:p>
+            <a:pPr marL="0" indent="0">
+              <a:buFont typeface="Arial" panose="020B0604020202020204" pitchFamily="34" charset="0"/>
+              <a:buNone/>
+            </a:pPr>
+            <a:r>
+              <a:rPr lang="fr-FR" dirty="0"/>
+              <a:t>Les indicateurs de réussite du projet :</a:t>
+            </a:r>
+          </a:p>
+          <a:p>
+            <a:pPr marL="0" indent="0">
+              <a:buFont typeface="Arial" panose="020B0604020202020204" pitchFamily="34" charset="0"/>
+              <a:buNone/>
+            </a:pPr>
+            <a:endParaRPr lang="fr-FR" dirty="0"/>
+          </a:p>
+          <a:p>
+            <a:r>
+              <a:rPr lang="fr-FR" dirty="0"/>
+              <a:t>Le retour sur investissement</a:t>
+            </a:r>
+          </a:p>
+          <a:p>
+            <a:pPr marL="0" indent="0">
+              <a:buNone/>
+            </a:pPr>
+            <a:endParaRPr lang="fr-FR" dirty="0"/>
+          </a:p>
+          <a:p>
+            <a:r>
+              <a:rPr lang="fr-FR" dirty="0"/>
+              <a:t>Le taux de satisfaction du client</a:t>
+            </a:r>
+          </a:p>
+          <a:p>
+            <a:pPr marL="0" indent="0">
+              <a:buNone/>
+            </a:pPr>
+            <a:endParaRPr lang="fr-FR" dirty="0"/>
+          </a:p>
+          <a:p>
+            <a:r>
+              <a:rPr lang="fr-FR" dirty="0"/>
+              <a:t>La qualité des services offerts</a:t>
+            </a:r>
+          </a:p>
+          <a:p>
+            <a:pPr marL="0" indent="0">
+              <a:buNone/>
+            </a:pPr>
+            <a:endParaRPr lang="fr-FR" dirty="0"/>
+          </a:p>
+          <a:p>
+            <a:r>
+              <a:rPr lang="fr-FR" dirty="0"/>
+              <a:t>Les écarts de coût du projet</a:t>
+            </a:r>
+          </a:p>
+        </p:txBody>
+      </p:sp>
+    </p:spTree>
+    <p:extLst>
+      <p:ext uri="{BB962C8B-B14F-4D97-AF65-F5344CB8AC3E}">
+        <p14:creationId xmlns:p14="http://schemas.microsoft.com/office/powerpoint/2010/main" val="65799866"/>
+      </p:ext>
+    </p:extLst>
+  </p:cSld>
+  <p:clrMapOvr>
+    <a:masterClrMapping/>
+  </p:clrMapOvr>
+</p:sld>
+</file>
+
 <file path=ppt/theme/theme1.xml><?xml version="1.0" encoding="utf-8"?>
 <a:theme xmlns:a="http://schemas.openxmlformats.org/drawingml/2006/main" name="Thème Office">
   <a:themeElements>

</xml_diff>